<commit_message>
Update CS 25-347_Poster Rough_Draft.pptx
</commit_message>
<xml_diff>
--- a/Project Deliverables/CS 25-347_Poster Rough_Draft.pptx
+++ b/Project Deliverables/CS 25-347_Poster Rough_Draft.pptx
@@ -3860,6 +3860,75 @@
               <a:t>across industries, supporting activities that require both human creativity and robotic precision. This advancement is *critical for the future of automation* in healthcare, manufacturing, and creative sectors.</a:t>
             </a:r>
           </a:p>
+          <a:p>
+            <a:endParaRPr lang="en-US" sz="3600" dirty="0">
+              <a:solidFill>
+                <a:schemeClr val="tx1"/>
+              </a:solidFill>
+              <a:latin typeface="Arial" panose="020B0604020202020204" pitchFamily="34" charset="0"/>
+              <a:cs typeface="Arial" panose="020B0604020202020204" pitchFamily="34" charset="0"/>
+            </a:endParaRPr>
+          </a:p>
+          <a:p>
+            <a:r>
+              <a:rPr lang="en-US" sz="4800" b="1" dirty="0">
+                <a:solidFill>
+                  <a:schemeClr val="tx1"/>
+                </a:solidFill>
+                <a:latin typeface="Arial" panose="020B0604020202020204" pitchFamily="34" charset="0"/>
+                <a:cs typeface="Arial" panose="020B0604020202020204" pitchFamily="34" charset="0"/>
+              </a:rPr>
+              <a:t>Building on Success</a:t>
+            </a:r>
+          </a:p>
+          <a:p>
+            <a:pPr marL="685800" indent="-685800">
+              <a:buFont typeface="Arial" panose="020B0604020202020204" pitchFamily="34" charset="0"/>
+              <a:buChar char="•"/>
+            </a:pPr>
+            <a:r>
+              <a:rPr lang="en-US" sz="3600" dirty="0">
+                <a:solidFill>
+                  <a:schemeClr val="tx1"/>
+                </a:solidFill>
+                <a:latin typeface="Arial" panose="020B0604020202020204" pitchFamily="34" charset="0"/>
+                <a:cs typeface="Arial" panose="020B0604020202020204" pitchFamily="34" charset="0"/>
+              </a:rPr>
+              <a:t>Phase 1 established virtual choreography of robotic movements</a:t>
+            </a:r>
+          </a:p>
+          <a:p>
+            <a:pPr marL="685800" indent="-685800">
+              <a:buFont typeface="Arial" panose="020B0604020202020204" pitchFamily="34" charset="0"/>
+              <a:buChar char="•"/>
+            </a:pPr>
+            <a:r>
+              <a:rPr lang="en-US" sz="3600" dirty="0">
+                <a:solidFill>
+                  <a:schemeClr val="tx1"/>
+                </a:solidFill>
+                <a:latin typeface="Arial" panose="020B0604020202020204" pitchFamily="34" charset="0"/>
+                <a:cs typeface="Arial" panose="020B0604020202020204" pitchFamily="34" charset="0"/>
+              </a:rPr>
+              <a:t>Phase 2 introduced basic proximity detection with "go/no-go" zones</a:t>
+            </a:r>
+          </a:p>
+          <a:p>
+            <a:pPr marL="685800" indent="-685800">
+              <a:buFont typeface="Arial" panose="020B0604020202020204" pitchFamily="34" charset="0"/>
+              <a:buChar char="•"/>
+            </a:pPr>
+            <a:r>
+              <a:rPr lang="en-US" sz="3600" dirty="0">
+                <a:solidFill>
+                  <a:schemeClr val="tx1"/>
+                </a:solidFill>
+                <a:latin typeface="Arial" panose="020B0604020202020204" pitchFamily="34" charset="0"/>
+                <a:cs typeface="Arial" panose="020B0604020202020204" pitchFamily="34" charset="0"/>
+              </a:rPr>
+              <a:t>Phase 3 (ECHO) aims to revolutionize human-robot interaction</a:t>
+            </a:r>
+          </a:p>
         </p:txBody>
       </p:sp>
       <p:sp>
@@ -3881,7 +3950,7 @@
           </a:xfrm>
           <a:prstGeom prst="roundRect">
             <a:avLst>
-              <a:gd name="adj" fmla="val 3100"/>
+              <a:gd name="adj" fmla="val 1791"/>
             </a:avLst>
           </a:prstGeom>
           <a:gradFill>
@@ -3972,7 +4041,7 @@
         <p:spPr>
           <a:xfrm>
             <a:off x="32308801" y="5943600"/>
-            <a:ext cx="10972800" cy="10515600"/>
+            <a:ext cx="10972800" cy="9829800"/>
           </a:xfrm>
           <a:prstGeom prst="roundRect">
             <a:avLst>
@@ -4014,8 +4083,6 @@
               </a:rPr>
               <a:t>Future Work</a:t>
             </a:r>
-          </a:p>
-          <a:p>
             <a:endParaRPr lang="en-US" sz="3200" dirty="0">
               <a:solidFill>
                 <a:schemeClr val="tx1"/>
@@ -4026,7 +4093,7 @@
           </a:p>
           <a:p>
             <a:r>
-              <a:rPr lang="en-US" sz="4000" b="1" dirty="0">
+              <a:rPr lang="en-US" sz="3600" b="1" dirty="0">
                 <a:solidFill>
                   <a:schemeClr val="tx1"/>
                 </a:solidFill>
@@ -4035,7 +4102,7 @@
               </a:rPr>
               <a:t>Long-term Deployment Studies</a:t>
             </a:r>
-            <a:endParaRPr lang="en-US" sz="4000" dirty="0">
+            <a:endParaRPr lang="en-US" sz="3600" dirty="0">
               <a:solidFill>
                 <a:schemeClr val="tx1"/>
               </a:solidFill>
@@ -4044,28 +4111,24 @@
             </a:endParaRPr>
           </a:p>
           <a:p>
-            <a:pPr>
-              <a:buFont typeface="Arial" panose="020B0604020202020204" pitchFamily="34" charset="0"/>
-              <a:buChar char="•"/>
-            </a:pPr>
-            <a:r>
-              <a:rPr lang="en-US" sz="3800" dirty="0">
+            <a:r>
+              <a:rPr lang="en-US" sz="3600" dirty="0">
                 <a:solidFill>
                   <a:schemeClr val="tx1"/>
                 </a:solidFill>
                 <a:latin typeface="Arial" panose="020B0604020202020204" pitchFamily="34" charset="0"/>
                 <a:cs typeface="Arial" panose="020B0604020202020204" pitchFamily="34" charset="0"/>
               </a:rPr>
-              <a:t>Test ECHO in real work settings like: </a:t>
-            </a:r>
-          </a:p>
-          <a:p>
-            <a:pPr marL="742950" lvl="1" indent="-285750">
+              <a:t>Test ECHO in real work settings like:</a:t>
+            </a:r>
+          </a:p>
+          <a:p>
+            <a:pPr marL="571500" indent="-571500">
               <a:buFont typeface="Arial" panose="020B0604020202020204" pitchFamily="34" charset="0"/>
               <a:buChar char="•"/>
             </a:pPr>
             <a:r>
-              <a:rPr lang="en-US" sz="3800" dirty="0">
+              <a:rPr lang="en-US" sz="3600" dirty="0">
                 <a:solidFill>
                   <a:schemeClr val="tx1"/>
                 </a:solidFill>
@@ -4076,12 +4139,12 @@
             </a:r>
           </a:p>
           <a:p>
-            <a:pPr marL="742950" lvl="1" indent="-285750">
+            <a:pPr marL="571500" indent="-571500">
               <a:buFont typeface="Arial" panose="020B0604020202020204" pitchFamily="34" charset="0"/>
               <a:buChar char="•"/>
             </a:pPr>
             <a:r>
-              <a:rPr lang="en-US" sz="3800" dirty="0">
+              <a:rPr lang="en-US" sz="3600" dirty="0">
                 <a:solidFill>
                   <a:schemeClr val="tx1"/>
                 </a:solidFill>
@@ -4092,12 +4155,12 @@
             </a:r>
           </a:p>
           <a:p>
-            <a:pPr marL="742950" lvl="1" indent="-285750">
+            <a:pPr marL="571500" indent="-571500">
               <a:buFont typeface="Arial" panose="020B0604020202020204" pitchFamily="34" charset="0"/>
               <a:buChar char="•"/>
             </a:pPr>
             <a:r>
-              <a:rPr lang="en-US" sz="3800" dirty="0">
+              <a:rPr lang="en-US" sz="3600" dirty="0">
                 <a:solidFill>
                   <a:schemeClr val="tx1"/>
                 </a:solidFill>
@@ -4108,12 +4171,17 @@
             </a:r>
           </a:p>
           <a:p>
-            <a:pPr>
-              <a:buFont typeface="Arial" panose="020B0604020202020204" pitchFamily="34" charset="0"/>
-              <a:buChar char="•"/>
-            </a:pPr>
-            <a:r>
-              <a:rPr lang="en-US" sz="3800" dirty="0">
+            <a:endParaRPr lang="en-US" sz="3600" dirty="0">
+              <a:solidFill>
+                <a:schemeClr val="tx1"/>
+              </a:solidFill>
+              <a:latin typeface="Arial" panose="020B0604020202020204" pitchFamily="34" charset="0"/>
+              <a:cs typeface="Arial" panose="020B0604020202020204" pitchFamily="34" charset="0"/>
+            </a:endParaRPr>
+          </a:p>
+          <a:p>
+            <a:r>
+              <a:rPr lang="en-US" sz="3600" dirty="0">
                 <a:solidFill>
                   <a:schemeClr val="tx1"/>
                 </a:solidFill>
@@ -4148,8 +4216,8 @@
         </p:nvSpPr>
         <p:spPr>
           <a:xfrm>
-            <a:off x="32308801" y="16927675"/>
-            <a:ext cx="10972800" cy="11854154"/>
+            <a:off x="32308801" y="16470476"/>
+            <a:ext cx="10972800" cy="11430000"/>
           </a:xfrm>
           <a:prstGeom prst="roundRect">
             <a:avLst>
@@ -4191,8 +4259,6 @@
               </a:rPr>
               <a:t>Potential Challenges and Limitations</a:t>
             </a:r>
-          </a:p>
-          <a:p>
             <a:endParaRPr lang="en-US" sz="4800" dirty="0">
               <a:solidFill>
                 <a:schemeClr val="tx1"/>
@@ -4279,13 +4345,13 @@
               </a:ext>
             </a:extLst>
           </a:blip>
-          <a:srcRect b="-34"/>
+          <a:srcRect t="8127" b="12661"/>
           <a:stretch/>
         </p:blipFill>
         <p:spPr bwMode="auto">
           <a:xfrm>
-            <a:off x="1203569" y="6580850"/>
-            <a:ext cx="9784859" cy="6537960"/>
+            <a:off x="1203569" y="6519589"/>
+            <a:ext cx="9784859" cy="5177112"/>
           </a:xfrm>
           <a:prstGeom prst="roundRect">
             <a:avLst>
@@ -4317,7 +4383,7 @@
           </p:cNvPicPr>
           <p:nvPr/>
         </p:nvPicPr>
-        <p:blipFill>
+        <p:blipFill rotWithShape="1">
           <a:blip r:embed="rId3">
             <a:extLst>
               <a:ext uri="{28A0092B-C50C-407E-A947-70E740481C1C}">
@@ -4325,15 +4391,13 @@
               </a:ext>
             </a:extLst>
           </a:blip>
-          <a:srcRect/>
-          <a:stretch>
-            <a:fillRect/>
-          </a:stretch>
+          <a:srcRect l="3605" t="26419" r="3822" b="26706"/>
+          <a:stretch/>
         </p:blipFill>
         <p:spPr bwMode="auto">
           <a:xfrm>
-            <a:off x="12925886" y="6263990"/>
-            <a:ext cx="7792349" cy="5662440"/>
+            <a:off x="12936220" y="8087066"/>
+            <a:ext cx="7213600" cy="2654301"/>
           </a:xfrm>
           <a:prstGeom prst="rect">
             <a:avLst/>
@@ -4353,72 +4417,427 @@
           </a:extLst>
         </p:spPr>
       </p:pic>
+      <p:sp>
+        <p:nvSpPr>
+          <p:cNvPr id="15" name="TextBox 14">
+            <a:extLst>
+              <a:ext uri="{FF2B5EF4-FFF2-40B4-BE49-F238E27FC236}">
+                <a16:creationId xmlns:a16="http://schemas.microsoft.com/office/drawing/2014/main" id="{94527C63-CA70-6D16-8C82-690297CE269A}"/>
+              </a:ext>
+            </a:extLst>
+          </p:cNvPr>
+          <p:cNvSpPr txBox="1"/>
+          <p:nvPr/>
+        </p:nvSpPr>
+        <p:spPr>
+          <a:xfrm>
+            <a:off x="12936220" y="11201400"/>
+            <a:ext cx="8559324" cy="2862322"/>
+          </a:xfrm>
+          <a:prstGeom prst="rect">
+            <a:avLst/>
+          </a:prstGeom>
+          <a:noFill/>
+        </p:spPr>
+        <p:txBody>
+          <a:bodyPr wrap="square" rtlCol="0">
+            <a:spAutoFit/>
+          </a:bodyPr>
+          <a:lstStyle/>
+          <a:p>
+            <a:r>
+              <a:rPr lang="en-US" sz="3600" b="1" dirty="0">
+                <a:latin typeface="Arial" panose="020B0604020202020204" pitchFamily="34" charset="0"/>
+                <a:cs typeface="Arial" panose="020B0604020202020204" pitchFamily="34" charset="0"/>
+              </a:rPr>
+              <a:t>Pros:</a:t>
+            </a:r>
+          </a:p>
+          <a:p>
+            <a:endParaRPr lang="en-US" sz="3600" dirty="0">
+              <a:latin typeface="Arial" panose="020B0604020202020204" pitchFamily="34" charset="0"/>
+              <a:cs typeface="Arial" panose="020B0604020202020204" pitchFamily="34" charset="0"/>
+            </a:endParaRPr>
+          </a:p>
+          <a:p>
+            <a:endParaRPr lang="en-US" sz="3600" dirty="0">
+              <a:latin typeface="Arial" panose="020B0604020202020204" pitchFamily="34" charset="0"/>
+              <a:cs typeface="Arial" panose="020B0604020202020204" pitchFamily="34" charset="0"/>
+            </a:endParaRPr>
+          </a:p>
+          <a:p>
+            <a:endParaRPr lang="en-US" sz="3600" dirty="0">
+              <a:latin typeface="Arial" panose="020B0604020202020204" pitchFamily="34" charset="0"/>
+              <a:cs typeface="Arial" panose="020B0604020202020204" pitchFamily="34" charset="0"/>
+            </a:endParaRPr>
+          </a:p>
+          <a:p>
+            <a:r>
+              <a:rPr lang="en-US" sz="3600" b="1" dirty="0">
+                <a:latin typeface="Arial" panose="020B0604020202020204" pitchFamily="34" charset="0"/>
+                <a:cs typeface="Arial" panose="020B0604020202020204" pitchFamily="34" charset="0"/>
+              </a:rPr>
+              <a:t>Cons:</a:t>
+            </a:r>
+          </a:p>
+        </p:txBody>
+      </p:sp>
+      <p:sp>
+        <p:nvSpPr>
+          <p:cNvPr id="17" name="TextBox 16">
+            <a:extLst>
+              <a:ext uri="{FF2B5EF4-FFF2-40B4-BE49-F238E27FC236}">
+                <a16:creationId xmlns:a16="http://schemas.microsoft.com/office/drawing/2014/main" id="{2356747C-8D3D-09AD-0CE8-7E916904A819}"/>
+              </a:ext>
+            </a:extLst>
+          </p:cNvPr>
+          <p:cNvSpPr txBox="1"/>
+          <p:nvPr/>
+        </p:nvSpPr>
+        <p:spPr>
+          <a:xfrm>
+            <a:off x="22014343" y="11201400"/>
+            <a:ext cx="8662302" cy="5078313"/>
+          </a:xfrm>
+          <a:prstGeom prst="rect">
+            <a:avLst/>
+          </a:prstGeom>
+          <a:noFill/>
+        </p:spPr>
+        <p:txBody>
+          <a:bodyPr wrap="square" rtlCol="0">
+            <a:spAutoFit/>
+          </a:bodyPr>
+          <a:lstStyle/>
+          <a:p>
+            <a:r>
+              <a:rPr lang="en-US" sz="3600" b="1" dirty="0">
+                <a:latin typeface="Arial" panose="020B0604020202020204" pitchFamily="34" charset="0"/>
+                <a:cs typeface="Arial" panose="020B0604020202020204" pitchFamily="34" charset="0"/>
+              </a:rPr>
+              <a:t>Pros:</a:t>
+            </a:r>
+          </a:p>
+          <a:p>
+            <a:pPr marL="571500" indent="-571500">
+              <a:buFont typeface="Arial" panose="020B0604020202020204" pitchFamily="34" charset="0"/>
+              <a:buChar char="•"/>
+            </a:pPr>
+            <a:r>
+              <a:rPr lang="en-US" sz="3600" dirty="0">
+                <a:latin typeface="Arial" panose="020B0604020202020204" pitchFamily="34" charset="0"/>
+                <a:cs typeface="Arial" panose="020B0604020202020204" pitchFamily="34" charset="0"/>
+              </a:rPr>
+              <a:t>Human-skeleton detection capabilities</a:t>
+            </a:r>
+          </a:p>
+          <a:p>
+            <a:pPr marL="571500" indent="-571500">
+              <a:buFont typeface="Arial" panose="020B0604020202020204" pitchFamily="34" charset="0"/>
+              <a:buChar char="•"/>
+            </a:pPr>
+            <a:r>
+              <a:rPr lang="en-US" sz="3600" dirty="0">
+                <a:latin typeface="Arial" panose="020B0604020202020204" pitchFamily="34" charset="0"/>
+                <a:cs typeface="Arial" panose="020B0604020202020204" pitchFamily="34" charset="0"/>
+              </a:rPr>
+              <a:t>Able to determine distance of human in relation to Kinect sensor</a:t>
+            </a:r>
+          </a:p>
+          <a:p>
+            <a:r>
+              <a:rPr lang="en-US" sz="3600" b="1" dirty="0">
+                <a:latin typeface="Arial" panose="020B0604020202020204" pitchFamily="34" charset="0"/>
+                <a:cs typeface="Arial" panose="020B0604020202020204" pitchFamily="34" charset="0"/>
+              </a:rPr>
+              <a:t>Cons:</a:t>
+            </a:r>
+          </a:p>
+          <a:p>
+            <a:pPr marL="571500" indent="-571500">
+              <a:buFont typeface="Arial" panose="020B0604020202020204" pitchFamily="34" charset="0"/>
+              <a:buChar char="•"/>
+            </a:pPr>
+            <a:r>
+              <a:rPr lang="en-US" sz="3600" dirty="0">
+                <a:latin typeface="Arial" panose="020B0604020202020204" pitchFamily="34" charset="0"/>
+                <a:cs typeface="Arial" panose="020B0604020202020204" pitchFamily="34" charset="0"/>
+              </a:rPr>
+              <a:t>Connectivity issues with some hardware</a:t>
+            </a:r>
+          </a:p>
+          <a:p>
+            <a:pPr marL="571500" indent="-571500">
+              <a:buFont typeface="Arial" panose="020B0604020202020204" pitchFamily="34" charset="0"/>
+              <a:buChar char="•"/>
+            </a:pPr>
+            <a:r>
+              <a:rPr lang="en-US" sz="3600" dirty="0">
+                <a:latin typeface="Arial" panose="020B0604020202020204" pitchFamily="34" charset="0"/>
+                <a:cs typeface="Arial" panose="020B0604020202020204" pitchFamily="34" charset="0"/>
+              </a:rPr>
+              <a:t>Unable to determine distance from close range</a:t>
+            </a:r>
+          </a:p>
+        </p:txBody>
+      </p:sp>
+      <p:sp>
+        <p:nvSpPr>
+          <p:cNvPr id="18" name="TextBox 17">
+            <a:extLst>
+              <a:ext uri="{FF2B5EF4-FFF2-40B4-BE49-F238E27FC236}">
+                <a16:creationId xmlns:a16="http://schemas.microsoft.com/office/drawing/2014/main" id="{198FFFAF-9DC1-069E-9152-4F9CB9D30BD0}"/>
+              </a:ext>
+            </a:extLst>
+          </p:cNvPr>
+          <p:cNvSpPr txBox="1"/>
+          <p:nvPr/>
+        </p:nvSpPr>
+        <p:spPr>
+          <a:xfrm>
+            <a:off x="12833242" y="23365123"/>
+            <a:ext cx="8662302" cy="3416320"/>
+          </a:xfrm>
+          <a:prstGeom prst="rect">
+            <a:avLst/>
+          </a:prstGeom>
+          <a:noFill/>
+        </p:spPr>
+        <p:txBody>
+          <a:bodyPr wrap="square" rtlCol="0">
+            <a:spAutoFit/>
+          </a:bodyPr>
+          <a:lstStyle/>
+          <a:p>
+            <a:r>
+              <a:rPr lang="en-US" sz="3600" b="1" dirty="0">
+                <a:latin typeface="Arial" panose="020B0604020202020204" pitchFamily="34" charset="0"/>
+                <a:cs typeface="Arial" panose="020B0604020202020204" pitchFamily="34" charset="0"/>
+              </a:rPr>
+              <a:t>Pros:</a:t>
+            </a:r>
+          </a:p>
+          <a:p>
+            <a:pPr marL="571500" indent="-571500">
+              <a:buFont typeface="Arial" panose="020B0604020202020204" pitchFamily="34" charset="0"/>
+              <a:buChar char="•"/>
+            </a:pPr>
+            <a:r>
+              <a:rPr lang="en-US" sz="3600" dirty="0">
+                <a:latin typeface="Arial" panose="020B0604020202020204" pitchFamily="34" charset="0"/>
+                <a:cs typeface="Arial" panose="020B0604020202020204" pitchFamily="34" charset="0"/>
+              </a:rPr>
+              <a:t>Provides 360-degree view of surrounding</a:t>
+            </a:r>
+          </a:p>
+          <a:p>
+            <a:r>
+              <a:rPr lang="en-US" sz="3600" b="1" dirty="0">
+                <a:latin typeface="Arial" panose="020B0604020202020204" pitchFamily="34" charset="0"/>
+                <a:cs typeface="Arial" panose="020B0604020202020204" pitchFamily="34" charset="0"/>
+              </a:rPr>
+              <a:t>Cons:</a:t>
+            </a:r>
+          </a:p>
+          <a:p>
+            <a:pPr marL="571500" indent="-571500">
+              <a:buFont typeface="Arial" panose="020B0604020202020204" pitchFamily="34" charset="0"/>
+              <a:buChar char="•"/>
+            </a:pPr>
+            <a:r>
+              <a:rPr lang="en-US" sz="3600" dirty="0">
+                <a:latin typeface="Arial" panose="020B0604020202020204" pitchFamily="34" charset="0"/>
+                <a:cs typeface="Arial" panose="020B0604020202020204" pitchFamily="34" charset="0"/>
+              </a:rPr>
+              <a:t>Only provides a 2d view of the environment.</a:t>
+            </a:r>
+          </a:p>
+        </p:txBody>
+      </p:sp>
+      <p:sp>
+        <p:nvSpPr>
+          <p:cNvPr id="19" name="TextBox 18">
+            <a:extLst>
+              <a:ext uri="{FF2B5EF4-FFF2-40B4-BE49-F238E27FC236}">
+                <a16:creationId xmlns:a16="http://schemas.microsoft.com/office/drawing/2014/main" id="{F90386C2-F521-C9BB-0EDF-FB296B4B7093}"/>
+              </a:ext>
+            </a:extLst>
+          </p:cNvPr>
+          <p:cNvSpPr txBox="1"/>
+          <p:nvPr/>
+        </p:nvSpPr>
+        <p:spPr>
+          <a:xfrm>
+            <a:off x="22014343" y="23365123"/>
+            <a:ext cx="8662302" cy="3416320"/>
+          </a:xfrm>
+          <a:prstGeom prst="rect">
+            <a:avLst/>
+          </a:prstGeom>
+          <a:noFill/>
+        </p:spPr>
+        <p:txBody>
+          <a:bodyPr wrap="square" rtlCol="0">
+            <a:spAutoFit/>
+          </a:bodyPr>
+          <a:lstStyle/>
+          <a:p>
+            <a:r>
+              <a:rPr lang="en-US" sz="3600" b="1" dirty="0">
+                <a:latin typeface="Arial" panose="020B0604020202020204" pitchFamily="34" charset="0"/>
+                <a:cs typeface="Arial" panose="020B0604020202020204" pitchFamily="34" charset="0"/>
+              </a:rPr>
+              <a:t>Pros:</a:t>
+            </a:r>
+          </a:p>
+          <a:p>
+            <a:pPr marL="571500" indent="-571500">
+              <a:buFont typeface="Arial" panose="020B0604020202020204" pitchFamily="34" charset="0"/>
+              <a:buChar char="•"/>
+            </a:pPr>
+            <a:r>
+              <a:rPr lang="en-US" sz="3600" dirty="0">
+                <a:latin typeface="Arial" panose="020B0604020202020204" pitchFamily="34" charset="0"/>
+                <a:cs typeface="Arial" panose="020B0604020202020204" pitchFamily="34" charset="0"/>
+              </a:rPr>
+              <a:t>Easy to set up</a:t>
+            </a:r>
+          </a:p>
+          <a:p>
+            <a:pPr marL="571500" indent="-571500">
+              <a:buFont typeface="Arial" panose="020B0604020202020204" pitchFamily="34" charset="0"/>
+              <a:buChar char="•"/>
+            </a:pPr>
+            <a:r>
+              <a:rPr lang="en-US" sz="3600" dirty="0">
+                <a:latin typeface="Arial" panose="020B0604020202020204" pitchFamily="34" charset="0"/>
+                <a:cs typeface="Arial" panose="020B0604020202020204" pitchFamily="34" charset="0"/>
+              </a:rPr>
+              <a:t>Size makes it dynamic in terms of set up</a:t>
+            </a:r>
+          </a:p>
+          <a:p>
+            <a:r>
+              <a:rPr lang="en-US" sz="3600" b="1" dirty="0">
+                <a:latin typeface="Arial" panose="020B0604020202020204" pitchFamily="34" charset="0"/>
+                <a:cs typeface="Arial" panose="020B0604020202020204" pitchFamily="34" charset="0"/>
+              </a:rPr>
+              <a:t>Cons:</a:t>
+            </a:r>
+          </a:p>
+          <a:p>
+            <a:pPr marL="571500" indent="-571500">
+              <a:buFont typeface="Arial" panose="020B0604020202020204" pitchFamily="34" charset="0"/>
+              <a:buChar char="•"/>
+            </a:pPr>
+            <a:r>
+              <a:rPr lang="en-US" sz="3600" dirty="0">
+                <a:latin typeface="Arial" panose="020B0604020202020204" pitchFamily="34" charset="0"/>
+                <a:cs typeface="Arial" panose="020B0604020202020204" pitchFamily="34" charset="0"/>
+              </a:rPr>
+              <a:t>Provides only a linear point of view</a:t>
+            </a:r>
+          </a:p>
+        </p:txBody>
+      </p:sp>
       <p:pic>
         <p:nvPicPr>
-          <p:cNvPr id="6" name="Picture 5" descr="A black rectangular object with a white border&#10;&#10;Description automatically generated">
+          <p:cNvPr id="2" name="Picture 2" descr="GP2Y0A02YK0F Sharp - Datasheet PDF &amp; Technical Specs">
             <a:extLst>
               <a:ext uri="{FF2B5EF4-FFF2-40B4-BE49-F238E27FC236}">
-                <a16:creationId xmlns:a16="http://schemas.microsoft.com/office/drawing/2014/main" id="{6A049599-7C6E-C852-A7FD-78CDE8DA1EAC}"/>
+                <a16:creationId xmlns:a16="http://schemas.microsoft.com/office/drawing/2014/main" id="{6A88A765-AFDA-435D-B655-59772A897C6F}"/>
               </a:ext>
             </a:extLst>
           </p:cNvPr>
           <p:cNvPicPr>
-            <a:picLocks noChangeAspect="1"/>
+            <a:picLocks noChangeAspect="1" noChangeArrowheads="1"/>
           </p:cNvPicPr>
           <p:nvPr/>
         </p:nvPicPr>
         <p:blipFill>
-          <a:blip r:embed="rId4"/>
+          <a:blip r:embed="rId4">
+            <a:extLst>
+              <a:ext uri="{28A0092B-C50C-407E-A947-70E740481C1C}">
+                <a14:useLocalDpi xmlns:a14="http://schemas.microsoft.com/office/drawing/2010/main" val="0"/>
+              </a:ext>
+            </a:extLst>
+          </a:blip>
+          <a:srcRect/>
           <a:stretch>
             <a:fillRect/>
           </a:stretch>
         </p:blipFill>
-        <p:spPr>
+        <p:spPr bwMode="auto">
           <a:xfrm>
-            <a:off x="22236343" y="8071918"/>
-            <a:ext cx="7792349" cy="1940736"/>
+            <a:off x="23082434" y="17084327"/>
+            <a:ext cx="5796238" cy="5980246"/>
           </a:xfrm>
           <a:prstGeom prst="rect">
             <a:avLst/>
           </a:prstGeom>
+          <a:noFill/>
+          <a:extLst>
+            <a:ext uri="{909E8E84-426E-40DD-AFC4-6F175D3DCCD1}">
+              <a14:hiddenFill xmlns:a14="http://schemas.microsoft.com/office/drawing/2010/main">
+                <a:solidFill>
+                  <a:srgbClr val="FFFFFF"/>
+                </a:solidFill>
+              </a14:hiddenFill>
+            </a:ext>
+          </a:extLst>
         </p:spPr>
       </p:pic>
       <p:pic>
         <p:nvPicPr>
-          <p:cNvPr id="11" name="Picture 10">
+          <p:cNvPr id="3" name="Picture 4" descr="Microsoft announces standalone Kinect sensor for Xbox One">
             <a:extLst>
               <a:ext uri="{FF2B5EF4-FFF2-40B4-BE49-F238E27FC236}">
-                <a16:creationId xmlns:a16="http://schemas.microsoft.com/office/drawing/2014/main" id="{2FFBB8C4-23DD-DBFC-3BA4-285F520E861C}"/>
+                <a16:creationId xmlns:a16="http://schemas.microsoft.com/office/drawing/2014/main" id="{CFA65FDF-7D91-7191-D3F3-D7F07CEF419B}"/>
               </a:ext>
             </a:extLst>
           </p:cNvPr>
           <p:cNvPicPr>
-            <a:picLocks noChangeAspect="1"/>
+            <a:picLocks noChangeAspect="1" noChangeArrowheads="1"/>
           </p:cNvPicPr>
           <p:nvPr/>
         </p:nvPicPr>
-        <p:blipFill>
-          <a:blip r:embed="rId5"/>
-          <a:stretch>
-            <a:fillRect/>
-          </a:stretch>
+        <p:blipFill rotWithShape="1">
+          <a:blip r:embed="rId5">
+            <a:extLst>
+              <a:ext uri="{28A0092B-C50C-407E-A947-70E740481C1C}">
+                <a14:useLocalDpi xmlns:a14="http://schemas.microsoft.com/office/drawing/2010/main" val="0"/>
+              </a:ext>
+            </a:extLst>
+          </a:blip>
+          <a:srcRect l="3014" t="22672" r="3843" b="39916"/>
+          <a:stretch/>
         </p:blipFill>
-        <p:spPr>
+        <p:spPr bwMode="auto">
           <a:xfrm>
-            <a:off x="13452021" y="17384876"/>
-            <a:ext cx="5735647" cy="4795909"/>
+            <a:off x="22014343" y="8351225"/>
+            <a:ext cx="7932420" cy="2125981"/>
           </a:xfrm>
           <a:prstGeom prst="rect">
             <a:avLst/>
           </a:prstGeom>
+          <a:noFill/>
+          <a:extLst>
+            <a:ext uri="{909E8E84-426E-40DD-AFC4-6F175D3DCCD1}">
+              <a14:hiddenFill xmlns:a14="http://schemas.microsoft.com/office/drawing/2010/main">
+                <a:solidFill>
+                  <a:srgbClr val="FFFFFF"/>
+                </a:solidFill>
+              </a14:hiddenFill>
+            </a:ext>
+          </a:extLst>
         </p:spPr>
       </p:pic>
       <p:pic>
         <p:nvPicPr>
-          <p:cNvPr id="13" name="Picture 12">
+          <p:cNvPr id="7" name="Picture 6">
             <a:extLst>
               <a:ext uri="{FF2B5EF4-FFF2-40B4-BE49-F238E27FC236}">
-                <a16:creationId xmlns:a16="http://schemas.microsoft.com/office/drawing/2014/main" id="{295C4A3C-FE72-BB52-9F47-E9011C894FE3}"/>
+                <a16:creationId xmlns:a16="http://schemas.microsoft.com/office/drawing/2014/main" id="{10408479-C79D-02B5-357A-738FEE984C78}"/>
               </a:ext>
             </a:extLst>
           </p:cNvPr>
@@ -4429,343 +4848,19 @@
         </p:nvPicPr>
         <p:blipFill>
           <a:blip r:embed="rId6"/>
-          <a:stretch>
-            <a:fillRect/>
-          </a:stretch>
+          <a:srcRect l="4361" t="10743" r="1703" b="6808"/>
+          <a:stretch/>
         </p:blipFill>
         <p:spPr>
           <a:xfrm>
-            <a:off x="21912163" y="17799884"/>
-            <a:ext cx="5582741" cy="4380901"/>
+            <a:off x="13323570" y="17249392"/>
+            <a:ext cx="6438900" cy="5651500"/>
           </a:xfrm>
           <a:prstGeom prst="rect">
             <a:avLst/>
           </a:prstGeom>
         </p:spPr>
       </p:pic>
-      <p:sp>
-        <p:nvSpPr>
-          <p:cNvPr id="15" name="TextBox 14">
-            <a:extLst>
-              <a:ext uri="{FF2B5EF4-FFF2-40B4-BE49-F238E27FC236}">
-                <a16:creationId xmlns:a16="http://schemas.microsoft.com/office/drawing/2014/main" id="{94527C63-CA70-6D16-8C82-690297CE269A}"/>
-              </a:ext>
-            </a:extLst>
-          </p:cNvPr>
-          <p:cNvSpPr txBox="1"/>
-          <p:nvPr/>
-        </p:nvSpPr>
-        <p:spPr>
-          <a:xfrm>
-            <a:off x="13299621" y="10741367"/>
-            <a:ext cx="7394121" cy="2862322"/>
-          </a:xfrm>
-          <a:prstGeom prst="rect">
-            <a:avLst/>
-          </a:prstGeom>
-          <a:noFill/>
-        </p:spPr>
-        <p:txBody>
-          <a:bodyPr wrap="square" rtlCol="0">
-            <a:spAutoFit/>
-          </a:bodyPr>
-          <a:lstStyle/>
-          <a:p>
-            <a:r>
-              <a:rPr lang="en-US" sz="3600" dirty="0">
-                <a:latin typeface="Arial" panose="020B0604020202020204" pitchFamily="34" charset="0"/>
-                <a:cs typeface="Arial" panose="020B0604020202020204" pitchFamily="34" charset="0"/>
-              </a:rPr>
-              <a:t>Pros:</a:t>
-            </a:r>
-          </a:p>
-          <a:p>
-            <a:endParaRPr lang="en-US" sz="3600" dirty="0">
-              <a:latin typeface="Arial" panose="020B0604020202020204" pitchFamily="34" charset="0"/>
-              <a:cs typeface="Arial" panose="020B0604020202020204" pitchFamily="34" charset="0"/>
-            </a:endParaRPr>
-          </a:p>
-          <a:p>
-            <a:endParaRPr lang="en-US" sz="3600" dirty="0">
-              <a:latin typeface="Arial" panose="020B0604020202020204" pitchFamily="34" charset="0"/>
-              <a:cs typeface="Arial" panose="020B0604020202020204" pitchFamily="34" charset="0"/>
-            </a:endParaRPr>
-          </a:p>
-          <a:p>
-            <a:endParaRPr lang="en-US" sz="3600" dirty="0">
-              <a:latin typeface="Arial" panose="020B0604020202020204" pitchFamily="34" charset="0"/>
-              <a:cs typeface="Arial" panose="020B0604020202020204" pitchFamily="34" charset="0"/>
-            </a:endParaRPr>
-          </a:p>
-          <a:p>
-            <a:r>
-              <a:rPr lang="en-US" sz="3600" dirty="0">
-                <a:latin typeface="Arial" panose="020B0604020202020204" pitchFamily="34" charset="0"/>
-                <a:cs typeface="Arial" panose="020B0604020202020204" pitchFamily="34" charset="0"/>
-              </a:rPr>
-              <a:t>Cons:</a:t>
-            </a:r>
-          </a:p>
-        </p:txBody>
-      </p:sp>
-      <p:sp>
-        <p:nvSpPr>
-          <p:cNvPr id="17" name="TextBox 16">
-            <a:extLst>
-              <a:ext uri="{FF2B5EF4-FFF2-40B4-BE49-F238E27FC236}">
-                <a16:creationId xmlns:a16="http://schemas.microsoft.com/office/drawing/2014/main" id="{2356747C-8D3D-09AD-0CE8-7E916904A819}"/>
-              </a:ext>
-            </a:extLst>
-          </p:cNvPr>
-          <p:cNvSpPr txBox="1"/>
-          <p:nvPr/>
-        </p:nvSpPr>
-        <p:spPr>
-          <a:xfrm>
-            <a:off x="22236343" y="10741367"/>
-            <a:ext cx="7039099" cy="6186309"/>
-          </a:xfrm>
-          <a:prstGeom prst="rect">
-            <a:avLst/>
-          </a:prstGeom>
-          <a:noFill/>
-        </p:spPr>
-        <p:txBody>
-          <a:bodyPr wrap="square" rtlCol="0">
-            <a:spAutoFit/>
-          </a:bodyPr>
-          <a:lstStyle/>
-          <a:p>
-            <a:r>
-              <a:rPr lang="en-US" sz="3600" dirty="0">
-                <a:latin typeface="Arial" panose="020B0604020202020204" pitchFamily="34" charset="0"/>
-                <a:cs typeface="Arial" panose="020B0604020202020204" pitchFamily="34" charset="0"/>
-              </a:rPr>
-              <a:t>Pros:</a:t>
-            </a:r>
-          </a:p>
-          <a:p>
-            <a:pPr marL="571500" indent="-571500">
-              <a:buFont typeface="Arial" panose="020B0604020202020204" pitchFamily="34" charset="0"/>
-              <a:buChar char="•"/>
-            </a:pPr>
-            <a:r>
-              <a:rPr lang="en-US" sz="3600" dirty="0">
-                <a:latin typeface="Arial" panose="020B0604020202020204" pitchFamily="34" charset="0"/>
-                <a:cs typeface="Arial" panose="020B0604020202020204" pitchFamily="34" charset="0"/>
-              </a:rPr>
-              <a:t>Human-skeleton detection capabilities.</a:t>
-            </a:r>
-          </a:p>
-          <a:p>
-            <a:pPr marL="571500" indent="-571500">
-              <a:buFont typeface="Arial" panose="020B0604020202020204" pitchFamily="34" charset="0"/>
-              <a:buChar char="•"/>
-            </a:pPr>
-            <a:r>
-              <a:rPr lang="en-US" sz="3600" dirty="0">
-                <a:latin typeface="Arial" panose="020B0604020202020204" pitchFamily="34" charset="0"/>
-                <a:cs typeface="Arial" panose="020B0604020202020204" pitchFamily="34" charset="0"/>
-              </a:rPr>
-              <a:t>Able to determine distance of human in relation to Kinect sensor.</a:t>
-            </a:r>
-          </a:p>
-          <a:p>
-            <a:r>
-              <a:rPr lang="en-US" sz="3600" dirty="0">
-                <a:latin typeface="Arial" panose="020B0604020202020204" pitchFamily="34" charset="0"/>
-                <a:cs typeface="Arial" panose="020B0604020202020204" pitchFamily="34" charset="0"/>
-              </a:rPr>
-              <a:t>Cons:</a:t>
-            </a:r>
-          </a:p>
-          <a:p>
-            <a:pPr marL="571500" indent="-571500">
-              <a:buFont typeface="Arial" panose="020B0604020202020204" pitchFamily="34" charset="0"/>
-              <a:buChar char="•"/>
-            </a:pPr>
-            <a:r>
-              <a:rPr lang="en-US" sz="3600" dirty="0">
-                <a:latin typeface="Arial" panose="020B0604020202020204" pitchFamily="34" charset="0"/>
-                <a:cs typeface="Arial" panose="020B0604020202020204" pitchFamily="34" charset="0"/>
-              </a:rPr>
-              <a:t>Connectivity issues with some hardware.</a:t>
-            </a:r>
-          </a:p>
-          <a:p>
-            <a:pPr marL="571500" indent="-571500">
-              <a:buFont typeface="Arial" panose="020B0604020202020204" pitchFamily="34" charset="0"/>
-              <a:buChar char="•"/>
-            </a:pPr>
-            <a:r>
-              <a:rPr lang="en-US" sz="3600" dirty="0">
-                <a:latin typeface="Arial" panose="020B0604020202020204" pitchFamily="34" charset="0"/>
-                <a:cs typeface="Arial" panose="020B0604020202020204" pitchFamily="34" charset="0"/>
-              </a:rPr>
-              <a:t>Unable to determine distance from close range.</a:t>
-            </a:r>
-          </a:p>
-        </p:txBody>
-      </p:sp>
-      <p:sp>
-        <p:nvSpPr>
-          <p:cNvPr id="18" name="TextBox 17">
-            <a:extLst>
-              <a:ext uri="{FF2B5EF4-FFF2-40B4-BE49-F238E27FC236}">
-                <a16:creationId xmlns:a16="http://schemas.microsoft.com/office/drawing/2014/main" id="{198FFFAF-9DC1-069E-9152-4F9CB9D30BD0}"/>
-              </a:ext>
-            </a:extLst>
-          </p:cNvPr>
-          <p:cNvSpPr txBox="1"/>
-          <p:nvPr/>
-        </p:nvSpPr>
-        <p:spPr>
-          <a:xfrm>
-            <a:off x="13217415" y="22810081"/>
-            <a:ext cx="7394121" cy="3416320"/>
-          </a:xfrm>
-          <a:prstGeom prst="rect">
-            <a:avLst/>
-          </a:prstGeom>
-          <a:noFill/>
-        </p:spPr>
-        <p:txBody>
-          <a:bodyPr wrap="square" rtlCol="0">
-            <a:spAutoFit/>
-          </a:bodyPr>
-          <a:lstStyle/>
-          <a:p>
-            <a:r>
-              <a:rPr lang="en-US" sz="3600" dirty="0">
-                <a:latin typeface="Arial" panose="020B0604020202020204" pitchFamily="34" charset="0"/>
-                <a:cs typeface="Arial" panose="020B0604020202020204" pitchFamily="34" charset="0"/>
-              </a:rPr>
-              <a:t>Pros:</a:t>
-            </a:r>
-          </a:p>
-          <a:p>
-            <a:pPr marL="571500" indent="-571500">
-              <a:buFont typeface="Arial" panose="020B0604020202020204" pitchFamily="34" charset="0"/>
-              <a:buChar char="•"/>
-            </a:pPr>
-            <a:r>
-              <a:rPr lang="en-US" sz="3600" dirty="0">
-                <a:latin typeface="Arial" panose="020B0604020202020204" pitchFamily="34" charset="0"/>
-                <a:cs typeface="Arial" panose="020B0604020202020204" pitchFamily="34" charset="0"/>
-              </a:rPr>
-              <a:t>Provides 360-degree view of surrounding</a:t>
-            </a:r>
-          </a:p>
-          <a:p>
-            <a:r>
-              <a:rPr lang="en-US" sz="3600" dirty="0">
-                <a:latin typeface="Arial" panose="020B0604020202020204" pitchFamily="34" charset="0"/>
-                <a:cs typeface="Arial" panose="020B0604020202020204" pitchFamily="34" charset="0"/>
-              </a:rPr>
-              <a:t>Cons:</a:t>
-            </a:r>
-          </a:p>
-          <a:p>
-            <a:pPr marL="571500" indent="-571500">
-              <a:buFont typeface="Arial" panose="020B0604020202020204" pitchFamily="34" charset="0"/>
-              <a:buChar char="•"/>
-            </a:pPr>
-            <a:r>
-              <a:rPr lang="en-US" sz="3600" dirty="0">
-                <a:latin typeface="Arial" panose="020B0604020202020204" pitchFamily="34" charset="0"/>
-                <a:cs typeface="Arial" panose="020B0604020202020204" pitchFamily="34" charset="0"/>
-              </a:rPr>
-              <a:t>Only provides a 2d view of the environment.</a:t>
-            </a:r>
-          </a:p>
-        </p:txBody>
-      </p:sp>
-      <p:sp>
-        <p:nvSpPr>
-          <p:cNvPr id="19" name="TextBox 18">
-            <a:extLst>
-              <a:ext uri="{FF2B5EF4-FFF2-40B4-BE49-F238E27FC236}">
-                <a16:creationId xmlns:a16="http://schemas.microsoft.com/office/drawing/2014/main" id="{F90386C2-F521-C9BB-0EDF-FB296B4B7093}"/>
-              </a:ext>
-            </a:extLst>
-          </p:cNvPr>
-          <p:cNvSpPr txBox="1"/>
-          <p:nvPr/>
-        </p:nvSpPr>
-        <p:spPr>
-          <a:xfrm>
-            <a:off x="21484551" y="23052993"/>
-            <a:ext cx="7394121" cy="3970318"/>
-          </a:xfrm>
-          <a:prstGeom prst="rect">
-            <a:avLst/>
-          </a:prstGeom>
-          <a:noFill/>
-        </p:spPr>
-        <p:txBody>
-          <a:bodyPr wrap="square" rtlCol="0">
-            <a:spAutoFit/>
-          </a:bodyPr>
-          <a:lstStyle/>
-          <a:p>
-            <a:r>
-              <a:rPr lang="en-US" sz="3600" dirty="0">
-                <a:latin typeface="Arial" panose="020B0604020202020204" pitchFamily="34" charset="0"/>
-                <a:cs typeface="Arial" panose="020B0604020202020204" pitchFamily="34" charset="0"/>
-              </a:rPr>
-              <a:t>Pros:</a:t>
-            </a:r>
-          </a:p>
-          <a:p>
-            <a:pPr marL="571500" indent="-571500">
-              <a:buFont typeface="Arial" panose="020B0604020202020204" pitchFamily="34" charset="0"/>
-              <a:buChar char="•"/>
-            </a:pPr>
-            <a:r>
-              <a:rPr lang="en-US" sz="3600" dirty="0">
-                <a:latin typeface="Arial" panose="020B0604020202020204" pitchFamily="34" charset="0"/>
-                <a:cs typeface="Arial" panose="020B0604020202020204" pitchFamily="34" charset="0"/>
-              </a:rPr>
-              <a:t>Easy to set up</a:t>
-            </a:r>
-          </a:p>
-          <a:p>
-            <a:pPr marL="571500" indent="-571500">
-              <a:buFont typeface="Arial" panose="020B0604020202020204" pitchFamily="34" charset="0"/>
-              <a:buChar char="•"/>
-            </a:pPr>
-            <a:r>
-              <a:rPr lang="en-US" sz="3600" dirty="0">
-                <a:latin typeface="Arial" panose="020B0604020202020204" pitchFamily="34" charset="0"/>
-                <a:cs typeface="Arial" panose="020B0604020202020204" pitchFamily="34" charset="0"/>
-              </a:rPr>
-              <a:t>Size makes it dynamic in terms of set up</a:t>
-            </a:r>
-          </a:p>
-          <a:p>
-            <a:r>
-              <a:rPr lang="en-US" sz="3600" dirty="0">
-                <a:latin typeface="Arial" panose="020B0604020202020204" pitchFamily="34" charset="0"/>
-                <a:cs typeface="Arial" panose="020B0604020202020204" pitchFamily="34" charset="0"/>
-              </a:rPr>
-              <a:t>Cons:</a:t>
-            </a:r>
-          </a:p>
-          <a:p>
-            <a:pPr marL="571500" indent="-571500">
-              <a:buFont typeface="Arial" panose="020B0604020202020204" pitchFamily="34" charset="0"/>
-              <a:buChar char="•"/>
-            </a:pPr>
-            <a:r>
-              <a:rPr lang="en-US" sz="3600" dirty="0">
-                <a:latin typeface="Arial" panose="020B0604020202020204" pitchFamily="34" charset="0"/>
-                <a:cs typeface="Arial" panose="020B0604020202020204" pitchFamily="34" charset="0"/>
-              </a:rPr>
-              <a:t>Provides only a linear point of view</a:t>
-            </a:r>
-          </a:p>
-        </p:txBody>
-      </p:sp>
     </p:spTree>
     <p:extLst>
       <p:ext uri="{BB962C8B-B14F-4D97-AF65-F5344CB8AC3E}">

</xml_diff>